<commit_message>
Minor edits to dark-side/2022-talk
</commit_message>
<xml_diff>
--- a/dark-side/2022-talk.pptx
+++ b/dark-side/2022-talk.pptx
@@ -5,7 +5,7 @@
     <p:sldMasterId id="2147483648" r:id="rId1"/>
   </p:sldMasterIdLst>
   <p:notesMasterIdLst>
-    <p:notesMasterId r:id="rId40"/>
+    <p:notesMasterId r:id="rId43"/>
   </p:notesMasterIdLst>
   <p:sldIdLst>
     <p:sldId id="256" r:id="rId2"/>
@@ -46,6 +46,9 @@
     <p:sldId id="291" r:id="rId37"/>
     <p:sldId id="292" r:id="rId38"/>
     <p:sldId id="293" r:id="rId39"/>
+    <p:sldId id="294" r:id="rId40"/>
+    <p:sldId id="295" r:id="rId41"/>
+    <p:sldId id="296" r:id="rId42"/>
   </p:sldIdLst>
   <p:sldSz cx="9144000" cy="5143500" type="screen16x9"/>
   <p:notesSz cx="6858000" cy="9144000"/>
@@ -3529,21 +3532,7 @@
             </a:pPr>
             <a:r>
               <a:rPr/>
-              <a:t>I’d like to end with an exhortation. We need people like you in data science. It’s okay to spend most of your time learning the complexities of medicine, but some of you have a bit of talent and aptitude in math/stat and in computers/coding. That’s an advantage your generation has that my generation did not. So you have the ability to appreciate the full picture more so than people my age. A few of us knew computers well, but today’s generation is saturated in computational experience.</a:t>
-            </a:r>
-          </a:p>
-          <a:p>
-            <a:pPr lvl="0" indent="0" marL="0">
-              <a:buNone/>
-            </a:pPr>
-          </a:p>
-          <a:p>
-            <a:pPr lvl="0" indent="0" marL="0">
-              <a:buNone/>
-            </a:pPr>
-            <a:r>
-              <a:rPr/>
-              <a:t>Second, these research teams need a lot more racial and gender diversity. I try really hard to appreciate the viewpoints of people different than me, bit I can’t understand it at a level of someone who has seen life from a different perspective. If the only people developing these data science models are white males, then the models will continue to be biased against women and minorities.</a:t>
+              <a:t>I want to list a few quiz questions relating to this lecture. Remember these questions when I get to the slide that discusses them.</a:t>
             </a:r>
           </a:p>
         </p:txBody>
@@ -3566,6 +3555,266 @@
             <a:fld id="{18BDFEC3-8487-43E8-A154-7C12CBC1FFF2}" type="slidenum">
               <a:rPr lang="en-US"/>
               <a:t>38</a:t>
+            </a:fld>
+            <a:endParaRPr lang="en-US"/>
+          </a:p>
+        </p:txBody>
+      </p:sp>
+    </p:spTree>
+  </p:cSld>
+</p:notes>
+</file>
+
+<file path=ppt/notesSlides/notesSlide33.xml><?xml version="1.0" encoding="utf-8"?>
+<p:notes xmlns:a="http://schemas.openxmlformats.org/drawingml/2006/main" xmlns:r="http://schemas.openxmlformats.org/officeDocument/2006/relationships" xmlns:p="http://schemas.openxmlformats.org/presentationml/2006/main">
+  <p:cSld>
+    <p:spTree>
+      <p:nvGrpSpPr>
+        <p:cNvPr id="1" name=""/>
+        <p:cNvGrpSpPr/>
+        <p:nvPr/>
+      </p:nvGrpSpPr>
+      <p:grpSpPr>
+        <a:xfrm>
+          <a:off x="0" y="0"/>
+          <a:ext cx="0" cy="0"/>
+          <a:chOff x="0" y="0"/>
+          <a:chExt cx="0" cy="0"/>
+        </a:xfrm>
+      </p:grpSpPr>
+      <p:sp>
+        <p:nvSpPr>
+          <p:cNvPr id="2" name="Slide Image Placeholder 1"/>
+          <p:cNvSpPr>
+            <a:spLocks noGrp="1" noRot="1" noChangeAspect="1"/>
+          </p:cNvSpPr>
+          <p:nvPr>
+            <p:ph type="sldImg"/>
+          </p:nvPr>
+        </p:nvSpPr>
+        <p:spPr/>
+      </p:sp>
+      <p:sp>
+        <p:nvSpPr>
+          <p:cNvPr id="3" name="Notes Placeholder 2"/>
+          <p:cNvSpPr>
+            <a:spLocks noGrp="1"/>
+          </p:cNvSpPr>
+          <p:nvPr>
+            <p:ph type="body" idx="1"/>
+          </p:nvPr>
+        </p:nvSpPr>
+        <p:spPr/>
+        <p:txBody>
+          <a:bodyPr/>
+          <a:lstStyle/>
+          <a:p>
+            <a:pPr lvl="0" indent="0" marL="0">
+              <a:buNone/>
+            </a:pPr>
+            <a:r>
+              <a:rPr/>
+              <a:t>Here’s the second question.</a:t>
+            </a:r>
+          </a:p>
+        </p:txBody>
+      </p:sp>
+      <p:sp>
+        <p:nvSpPr>
+          <p:cNvPr id="4" name="Slide Number Placeholder 3"/>
+          <p:cNvSpPr>
+            <a:spLocks noGrp="1"/>
+          </p:cNvSpPr>
+          <p:nvPr>
+            <p:ph type="sldNum" sz="quarter" idx="10"/>
+          </p:nvPr>
+        </p:nvSpPr>
+        <p:spPr/>
+        <p:txBody>
+          <a:bodyPr/>
+          <a:lstStyle/>
+          <a:p>
+            <a:fld id="{18BDFEC3-8487-43E8-A154-7C12CBC1FFF2}" type="slidenum">
+              <a:rPr lang="en-US"/>
+              <a:t>39</a:t>
+            </a:fld>
+            <a:endParaRPr lang="en-US"/>
+          </a:p>
+        </p:txBody>
+      </p:sp>
+    </p:spTree>
+  </p:cSld>
+</p:notes>
+</file>
+
+<file path=ppt/notesSlides/notesSlide34.xml><?xml version="1.0" encoding="utf-8"?>
+<p:notes xmlns:a="http://schemas.openxmlformats.org/drawingml/2006/main" xmlns:r="http://schemas.openxmlformats.org/officeDocument/2006/relationships" xmlns:p="http://schemas.openxmlformats.org/presentationml/2006/main">
+  <p:cSld>
+    <p:spTree>
+      <p:nvGrpSpPr>
+        <p:cNvPr id="1" name=""/>
+        <p:cNvGrpSpPr/>
+        <p:nvPr/>
+      </p:nvGrpSpPr>
+      <p:grpSpPr>
+        <a:xfrm>
+          <a:off x="0" y="0"/>
+          <a:ext cx="0" cy="0"/>
+          <a:chOff x="0" y="0"/>
+          <a:chExt cx="0" cy="0"/>
+        </a:xfrm>
+      </p:grpSpPr>
+      <p:sp>
+        <p:nvSpPr>
+          <p:cNvPr id="2" name="Slide Image Placeholder 1"/>
+          <p:cNvSpPr>
+            <a:spLocks noGrp="1" noRot="1" noChangeAspect="1"/>
+          </p:cNvSpPr>
+          <p:nvPr>
+            <p:ph type="sldImg"/>
+          </p:nvPr>
+        </p:nvSpPr>
+        <p:spPr/>
+      </p:sp>
+      <p:sp>
+        <p:nvSpPr>
+          <p:cNvPr id="3" name="Notes Placeholder 2"/>
+          <p:cNvSpPr>
+            <a:spLocks noGrp="1"/>
+          </p:cNvSpPr>
+          <p:nvPr>
+            <p:ph type="body" idx="1"/>
+          </p:nvPr>
+        </p:nvSpPr>
+        <p:spPr/>
+        <p:txBody>
+          <a:bodyPr/>
+          <a:lstStyle/>
+          <a:p>
+            <a:pPr lvl="0" indent="0" marL="0">
+              <a:buNone/>
+            </a:pPr>
+            <a:r>
+              <a:rPr/>
+              <a:t>Here’s the third question. You don’t need to answer these questions now. Just be ready to answer them after the lecture.</a:t>
+            </a:r>
+          </a:p>
+        </p:txBody>
+      </p:sp>
+      <p:sp>
+        <p:nvSpPr>
+          <p:cNvPr id="4" name="Slide Number Placeholder 3"/>
+          <p:cNvSpPr>
+            <a:spLocks noGrp="1"/>
+          </p:cNvSpPr>
+          <p:nvPr>
+            <p:ph type="sldNum" sz="quarter" idx="10"/>
+          </p:nvPr>
+        </p:nvSpPr>
+        <p:spPr/>
+        <p:txBody>
+          <a:bodyPr/>
+          <a:lstStyle/>
+          <a:p>
+            <a:fld id="{18BDFEC3-8487-43E8-A154-7C12CBC1FFF2}" type="slidenum">
+              <a:rPr lang="en-US"/>
+              <a:t>40</a:t>
+            </a:fld>
+            <a:endParaRPr lang="en-US"/>
+          </a:p>
+        </p:txBody>
+      </p:sp>
+    </p:spTree>
+  </p:cSld>
+</p:notes>
+</file>
+
+<file path=ppt/notesSlides/notesSlide35.xml><?xml version="1.0" encoding="utf-8"?>
+<p:notes xmlns:a="http://schemas.openxmlformats.org/drawingml/2006/main" xmlns:r="http://schemas.openxmlformats.org/officeDocument/2006/relationships" xmlns:p="http://schemas.openxmlformats.org/presentationml/2006/main">
+  <p:cSld>
+    <p:spTree>
+      <p:nvGrpSpPr>
+        <p:cNvPr id="1" name=""/>
+        <p:cNvGrpSpPr/>
+        <p:nvPr/>
+      </p:nvGrpSpPr>
+      <p:grpSpPr>
+        <a:xfrm>
+          <a:off x="0" y="0"/>
+          <a:ext cx="0" cy="0"/>
+          <a:chOff x="0" y="0"/>
+          <a:chExt cx="0" cy="0"/>
+        </a:xfrm>
+      </p:grpSpPr>
+      <p:sp>
+        <p:nvSpPr>
+          <p:cNvPr id="2" name="Slide Image Placeholder 1"/>
+          <p:cNvSpPr>
+            <a:spLocks noGrp="1" noRot="1" noChangeAspect="1"/>
+          </p:cNvSpPr>
+          <p:nvPr>
+            <p:ph type="sldImg"/>
+          </p:nvPr>
+        </p:nvSpPr>
+        <p:spPr/>
+      </p:sp>
+      <p:sp>
+        <p:nvSpPr>
+          <p:cNvPr id="3" name="Notes Placeholder 2"/>
+          <p:cNvSpPr>
+            <a:spLocks noGrp="1"/>
+          </p:cNvSpPr>
+          <p:nvPr>
+            <p:ph type="body" idx="1"/>
+          </p:nvPr>
+        </p:nvSpPr>
+        <p:spPr/>
+        <p:txBody>
+          <a:bodyPr/>
+          <a:lstStyle/>
+          <a:p>
+            <a:pPr lvl="0" indent="0" marL="0">
+              <a:buNone/>
+            </a:pPr>
+            <a:r>
+              <a:rPr/>
+              <a:t>I’d like to end with an exhortation. We need people like you in data science. It’s okay to spend most of your time learning the complexities of medicine, but some of you have a bit of talent and aptitude in math/stat and in computers/coding. That’s an advantage your generation has that my generation did not. So you have the ability to appreciate the full picture more so than people my age. A few of us knew computers well, but today’s generation is saturated in computational experience.</a:t>
+            </a:r>
+          </a:p>
+          <a:p>
+            <a:pPr lvl="0" indent="0" marL="0">
+              <a:buNone/>
+            </a:pPr>
+          </a:p>
+          <a:p>
+            <a:pPr lvl="0" indent="0" marL="0">
+              <a:buNone/>
+            </a:pPr>
+            <a:r>
+              <a:rPr/>
+              <a:t>Second, these research teams need a lot more racial and gender diversity. I try really hard to appreciate the viewpoints of people different than me, bit I can’t understand it at a level of someone who has seen life from a different perspective. If the only people developing these data science models are white males, then the models will continue to be biased against women and minorities.</a:t>
+            </a:r>
+          </a:p>
+        </p:txBody>
+      </p:sp>
+      <p:sp>
+        <p:nvSpPr>
+          <p:cNvPr id="4" name="Slide Number Placeholder 3"/>
+          <p:cNvSpPr>
+            <a:spLocks noGrp="1"/>
+          </p:cNvSpPr>
+          <p:nvPr>
+            <p:ph type="sldNum" sz="quarter" idx="10"/>
+          </p:nvPr>
+        </p:nvSpPr>
+        <p:spPr/>
+        <p:txBody>
+          <a:bodyPr/>
+          <a:lstStyle/>
+          <a:p>
+            <a:fld id="{18BDFEC3-8487-43E8-A154-7C12CBC1FFF2}" type="slidenum">
+              <a:rPr lang="en-US"/>
+              <a:t>41</a:t>
             </a:fld>
             <a:endParaRPr lang="en-US"/>
           </a:p>
@@ -7475,7 +7724,7 @@
       </p:sp>
       <p:pic>
         <p:nvPicPr>
-          <p:cNvPr descr="fig:  http://www.pmean.com/new-images/21/dark-side-04.png" id="0" name="Picture 1"/>
+          <p:cNvPr descr="http://www.pmean.com/new-images/21/dark-side-04.png" id="0" name="Picture 1"/>
           <p:cNvPicPr>
             <a:picLocks noGrp="1" noChangeAspect="1"/>
           </p:cNvPicPr>
@@ -7798,7 +8047,7 @@
       </p:sp>
       <p:pic>
         <p:nvPicPr>
-          <p:cNvPr descr="fig:  http://www.pmean.com/new-images/21/dark-side-05.png" id="0" name="Picture 1"/>
+          <p:cNvPr descr="http://www.pmean.com/new-images/21/dark-side-05.png" id="0" name="Picture 1"/>
           <p:cNvPicPr>
             <a:picLocks noGrp="1" noChangeAspect="1"/>
           </p:cNvPicPr>
@@ -7905,7 +8154,7 @@
       </p:sp>
       <p:pic>
         <p:nvPicPr>
-          <p:cNvPr descr="fig:  http://www.pmean.com/new-images/19/leading-questions01.png" id="0" name="Picture 1"/>
+          <p:cNvPr descr="http://www.pmean.com/new-images/19/leading-questions01.png" id="0" name="Picture 1"/>
           <p:cNvPicPr>
             <a:picLocks noGrp="1" noChangeAspect="1"/>
           </p:cNvPicPr>
@@ -8012,7 +8261,7 @@
       </p:sp>
       <p:pic>
         <p:nvPicPr>
-          <p:cNvPr descr="fig:  http://www.pmean.com/new-images/21/dark-side-07.png" id="0" name="Picture 1"/>
+          <p:cNvPr descr="http://www.pmean.com/new-images/21/dark-side-07.png" id="0" name="Picture 1"/>
           <p:cNvPicPr>
             <a:picLocks noGrp="1" noChangeAspect="1"/>
           </p:cNvPicPr>
@@ -8575,7 +8824,7 @@
       </p:sp>
       <p:pic>
         <p:nvPicPr>
-          <p:cNvPr descr="fig:  http://www.pmean.com/new-images/21/dark-side-08.png" id="0" name="Picture 1"/>
+          <p:cNvPr descr="http://www.pmean.com/new-images/21/dark-side-08.png" id="0" name="Picture 1"/>
           <p:cNvPicPr>
             <a:picLocks noGrp="1" noChangeAspect="1"/>
           </p:cNvPicPr>
@@ -8682,7 +8931,7 @@
       </p:sp>
       <p:pic>
         <p:nvPicPr>
-          <p:cNvPr descr="fig:  http://www.pmean.com/new-images/21/dark-side-06.png" id="0" name="Picture 1"/>
+          <p:cNvPr descr="http://www.pmean.com/new-images/21/dark-side-06.png" id="0" name="Picture 1"/>
           <p:cNvPicPr>
             <a:picLocks noGrp="1" noChangeAspect="1"/>
           </p:cNvPicPr>
@@ -9419,7 +9668,7 @@
       </p:sp>
       <p:pic>
         <p:nvPicPr>
-          <p:cNvPr descr="fig:  http://www.pmean.com/new-images/21/dark-side-03.png" id="0" name="Picture 1"/>
+          <p:cNvPr descr="http://www.pmean.com/new-images/21/dark-side-03.png" id="0" name="Picture 1"/>
           <p:cNvPicPr>
             <a:picLocks noGrp="1" noChangeAspect="1"/>
           </p:cNvPicPr>
@@ -9598,7 +9847,7 @@
       </p:sp>
       <p:pic>
         <p:nvPicPr>
-          <p:cNvPr descr="fig:  http://www.pmean.com/new-images/21/aol-searcher-01.png" id="0" name="Picture 1"/>
+          <p:cNvPr descr="http://www.pmean.com/new-images/21/aol-searcher-01.png" id="0" name="Picture 1"/>
           <p:cNvPicPr>
             <a:picLocks noGrp="1" noChangeAspect="1"/>
           </p:cNvPicPr>
@@ -9705,7 +9954,7 @@
       </p:sp>
       <p:pic>
         <p:nvPicPr>
-          <p:cNvPr descr="fig:  http://www.pmean.com/new-images/21/null-license-plate-01.png" id="0" name="Picture 1"/>
+          <p:cNvPr descr="http://www.pmean.com/new-images/21/null-license-plate-01.png" id="0" name="Picture 1"/>
           <p:cNvPicPr>
             <a:picLocks noGrp="1" noChangeAspect="1"/>
           </p:cNvPicPr>
@@ -9812,7 +10061,7 @@
       </p:sp>
       <p:pic>
         <p:nvPicPr>
-          <p:cNvPr descr="fig:  http://www.pmean.com/new-images/21/bright-promise-01.png" id="0" name="Picture 1"/>
+          <p:cNvPr descr="http://www.pmean.com/new-images/21/bright-promise-01.png" id="0" name="Picture 1"/>
           <p:cNvPicPr>
             <a:picLocks noGrp="1" noChangeAspect="1"/>
           </p:cNvPicPr>
@@ -10091,7 +10340,12 @@
             <p:ph type="title"/>
           </p:nvPr>
         </p:nvSpPr>
-        <p:spPr/>
+        <p:spPr>
+          <a:xfrm>
+            <a:off x="457201" y="204787"/>
+            <a:ext cx="3008313" cy="871538"/>
+          </a:xfrm>
+        </p:spPr>
         <p:txBody>
           <a:bodyPr/>
           <a:lstStyle/>
@@ -10102,6 +10356,37 @@
             <a:r>
               <a:rPr/>
               <a:t>What they say data science is</a:t>
+            </a:r>
+          </a:p>
+        </p:txBody>
+      </p:sp>
+      <p:sp>
+        <p:nvSpPr>
+          <p:cNvPr id="4" name="Text Placeholder 3"/>
+          <p:cNvSpPr>
+            <a:spLocks noGrp="1"/>
+          </p:cNvSpPr>
+          <p:nvPr>
+            <p:ph idx="2" sz="half" type="body"/>
+          </p:nvPr>
+        </p:nvSpPr>
+        <p:spPr/>
+        <p:txBody>
+          <a:bodyPr/>
+          <a:lstStyle/>
+          <a:p>
+            <a:pPr lvl="0" indent="0">
+              <a:buNone/>
+            </a:pPr>
+            <a:r>
+              <a:rPr>
+                <a:latin typeface="Courier"/>
+              </a:rPr>
+              <a:t>## Warning: Using `size` aesthetic for lines was deprecated in ggplot2 3.4.0.
+## ℹ Please use `linewidth` instead.
+## This warning is displayed once every 8 hours.
+## Call `lifecycle::last_lifecycle_warnings()` to see where this warning was
+## generated.</a:t>
             </a:r>
           </a:p>
         </p:txBody>
@@ -10122,8 +10407,8 @@
         </p:blipFill>
         <p:spPr bwMode="auto">
           <a:xfrm>
-            <a:off x="2870200" y="1193800"/>
-            <a:ext cx="3390900" cy="3390900"/>
+            <a:off x="3937000" y="203200"/>
+            <a:ext cx="4381500" cy="4381500"/>
           </a:xfrm>
           <a:prstGeom prst="rect">
             <a:avLst/>
@@ -10255,7 +10540,7 @@
             </a:pPr>
             <a:r>
               <a:rPr/>
-              <a:t>Why you are needed</a:t>
+              <a:t>Repeat of quiz questions (1/3)</a:t>
             </a:r>
           </a:p>
         </p:txBody>
@@ -10275,56 +10560,140 @@
           <a:bodyPr/>
           <a:lstStyle/>
           <a:p>
-            <a:pPr lvl="0" indent="-342900" marL="342900">
-              <a:buAutoNum type="arabicPeriod"/>
-            </a:pPr>
-            <a:r>
-              <a:rPr/>
-              <a:t>Too many geeks, not enough scientists</a:t>
-            </a:r>
-          </a:p>
-          <a:p>
-            <a:pPr lvl="0" indent="-342900" marL="342900">
-              <a:buAutoNum type="arabicPeriod"/>
-            </a:pPr>
-            <a:r>
-              <a:rPr/>
-              <a:t>More racial, gender diversity is needed</a:t>
-            </a:r>
-          </a:p>
-          <a:p>
-            <a:pPr lvl="0" indent="0" marL="0">
-              <a:buNone/>
-            </a:pPr>
-            <a:r>
-              <a:rPr/>
-              <a:t>If you are interested, email me: </a:t>
-            </a:r>
-            <a:r>
-              <a:rPr>
-                <a:hlinkClick r:id="rId3"/>
-              </a:rPr>
-              <a:t>simons@umkc.edu</a:t>
-            </a:r>
-          </a:p>
-          <a:p>
-            <a:pPr lvl="0" indent="0" marL="0">
-              <a:buNone/>
-            </a:pPr>
-            <a:r>
-              <a:rPr/>
-              <a:t>You can find my talk here:</a:t>
-            </a:r>
-          </a:p>
-          <a:p>
-            <a:pPr lvl="0" indent="0" marL="0">
-              <a:buNone/>
-            </a:pPr>
-            <a:r>
-              <a:rPr>
-                <a:hlinkClick r:id="rId4"/>
-              </a:rPr>
-              <a:t>https://github.com/pmean/papers-and-presentations/blob/master/dark-side/2022-talk.pptx</a:t>
+            <a:pPr lvl="0" indent="0" marL="0">
+              <a:buNone/>
+            </a:pPr>
+            <a:r>
+              <a:rPr/>
+              <a:t>Why does Joel Best call statistics a social construct?</a:t>
+            </a:r>
+          </a:p>
+          <a:p>
+            <a:pPr lvl="0"/>
+            <a:r>
+              <a:rPr/>
+              <a:t>Statistics are misquoted often on social media.</a:t>
+            </a:r>
+          </a:p>
+          <a:p>
+            <a:pPr lvl="0"/>
+            <a:r>
+              <a:rPr/>
+              <a:t>Statistics are selected, shaped, and presented by human beings.</a:t>
+            </a:r>
+          </a:p>
+          <a:p>
+            <a:pPr lvl="0"/>
+            <a:r>
+              <a:rPr/>
+              <a:t>Statistics are used to promote socialism.</a:t>
+            </a:r>
+          </a:p>
+          <a:p>
+            <a:pPr lvl="0"/>
+            <a:r>
+              <a:rPr/>
+              <a:t>Statistics are dehumanizing.</a:t>
+            </a:r>
+          </a:p>
+        </p:txBody>
+      </p:sp>
+    </p:spTree>
+  </p:cSld>
+</p:sld>
+</file>
+
+<file path=ppt/slides/slide39.xml><?xml version="1.0" encoding="utf-8"?>
+<p:sld xmlns:a="http://schemas.openxmlformats.org/drawingml/2006/main" xmlns:r="http://schemas.openxmlformats.org/officeDocument/2006/relationships" xmlns:p="http://schemas.openxmlformats.org/presentationml/2006/main">
+  <p:cSld>
+    <p:spTree>
+      <p:nvGrpSpPr>
+        <p:cNvPr id="1" name=""/>
+        <p:cNvGrpSpPr/>
+        <p:nvPr/>
+      </p:nvGrpSpPr>
+      <p:grpSpPr>
+        <a:xfrm>
+          <a:off x="0" y="0"/>
+          <a:ext cx="0" cy="0"/>
+          <a:chOff x="0" y="0"/>
+          <a:chExt cx="0" cy="0"/>
+        </a:xfrm>
+      </p:grpSpPr>
+      <p:sp>
+        <p:nvSpPr>
+          <p:cNvPr id="2" name="Title 1"/>
+          <p:cNvSpPr>
+            <a:spLocks noGrp="1"/>
+          </p:cNvSpPr>
+          <p:nvPr>
+            <p:ph type="title"/>
+          </p:nvPr>
+        </p:nvSpPr>
+        <p:spPr/>
+        <p:txBody>
+          <a:bodyPr/>
+          <a:lstStyle/>
+          <a:p>
+            <a:pPr lvl="0" indent="0" marL="0">
+              <a:buNone/>
+            </a:pPr>
+            <a:r>
+              <a:rPr/>
+              <a:t>Repeat of quiz questions (2/3)</a:t>
+            </a:r>
+          </a:p>
+        </p:txBody>
+      </p:sp>
+      <p:sp>
+        <p:nvSpPr>
+          <p:cNvPr id="3" name="Content Placeholder 2"/>
+          <p:cNvSpPr>
+            <a:spLocks noGrp="1"/>
+          </p:cNvSpPr>
+          <p:nvPr>
+            <p:ph idx="1"/>
+          </p:nvPr>
+        </p:nvSpPr>
+        <p:spPr/>
+        <p:txBody>
+          <a:bodyPr/>
+          <a:lstStyle/>
+          <a:p>
+            <a:pPr lvl="0" indent="0" marL="0">
+              <a:buNone/>
+            </a:pPr>
+            <a:r>
+              <a:rPr/>
+              <a:t>What is the main philosophical foundation of empiricism?</a:t>
+            </a:r>
+          </a:p>
+          <a:p>
+            <a:pPr lvl="0"/>
+            <a:r>
+              <a:rPr/>
+              <a:t>Everything can be reduced to a mathematical equation.</a:t>
+            </a:r>
+          </a:p>
+          <a:p>
+            <a:pPr lvl="0"/>
+            <a:r>
+              <a:rPr/>
+              <a:t>Experiments can reveal the realities of the world.</a:t>
+            </a:r>
+          </a:p>
+          <a:p>
+            <a:pPr lvl="0"/>
+            <a:r>
+              <a:rPr/>
+              <a:t>Some questions are impossible to answer.</a:t>
+            </a:r>
+          </a:p>
+          <a:p>
+            <a:pPr lvl="0"/>
+            <a:r>
+              <a:rPr/>
+              <a:t>We construct our own reality based on our own lived experiences</a:t>
             </a:r>
           </a:p>
         </p:txBody>
@@ -10453,6 +10822,222 @@
 </p:sld>
 </file>
 
+<file path=ppt/slides/slide40.xml><?xml version="1.0" encoding="utf-8"?>
+<p:sld xmlns:a="http://schemas.openxmlformats.org/drawingml/2006/main" xmlns:r="http://schemas.openxmlformats.org/officeDocument/2006/relationships" xmlns:p="http://schemas.openxmlformats.org/presentationml/2006/main">
+  <p:cSld>
+    <p:spTree>
+      <p:nvGrpSpPr>
+        <p:cNvPr id="1" name=""/>
+        <p:cNvGrpSpPr/>
+        <p:nvPr/>
+      </p:nvGrpSpPr>
+      <p:grpSpPr>
+        <a:xfrm>
+          <a:off x="0" y="0"/>
+          <a:ext cx="0" cy="0"/>
+          <a:chOff x="0" y="0"/>
+          <a:chExt cx="0" cy="0"/>
+        </a:xfrm>
+      </p:grpSpPr>
+      <p:sp>
+        <p:nvSpPr>
+          <p:cNvPr id="2" name="Title 1"/>
+          <p:cNvSpPr>
+            <a:spLocks noGrp="1"/>
+          </p:cNvSpPr>
+          <p:nvPr>
+            <p:ph type="title"/>
+          </p:nvPr>
+        </p:nvSpPr>
+        <p:spPr/>
+        <p:txBody>
+          <a:bodyPr/>
+          <a:lstStyle/>
+          <a:p>
+            <a:pPr lvl="0" indent="0" marL="0">
+              <a:buNone/>
+            </a:pPr>
+            <a:r>
+              <a:rPr/>
+              <a:t>Repeat of quiz questions (3/3)</a:t>
+            </a:r>
+          </a:p>
+        </p:txBody>
+      </p:sp>
+      <p:sp>
+        <p:nvSpPr>
+          <p:cNvPr id="3" name="Content Placeholder 2"/>
+          <p:cNvSpPr>
+            <a:spLocks noGrp="1"/>
+          </p:cNvSpPr>
+          <p:nvPr>
+            <p:ph idx="1"/>
+          </p:nvPr>
+        </p:nvSpPr>
+        <p:spPr/>
+        <p:txBody>
+          <a:bodyPr/>
+          <a:lstStyle/>
+          <a:p>
+            <a:pPr lvl="0" indent="0" marL="0">
+              <a:buNone/>
+            </a:pPr>
+            <a:r>
+              <a:rPr/>
+              <a:t>What is a major problem with data science?</a:t>
+            </a:r>
+          </a:p>
+          <a:p>
+            <a:pPr lvl="0"/>
+            <a:r>
+              <a:rPr/>
+              <a:t>Data scientists rely on large amounts of data with uneven quality.</a:t>
+            </a:r>
+          </a:p>
+          <a:p>
+            <a:pPr lvl="0"/>
+            <a:r>
+              <a:rPr/>
+              <a:t>Models developed by data scientists can lead to loss of privacy.</a:t>
+            </a:r>
+          </a:p>
+          <a:p>
+            <a:pPr lvl="0"/>
+            <a:r>
+              <a:rPr/>
+              <a:t>Prediction models are a black box that can hide discriminatory intent.</a:t>
+            </a:r>
+          </a:p>
+          <a:p>
+            <a:pPr lvl="0"/>
+            <a:r>
+              <a:rPr/>
+              <a:t>All of the above.</a:t>
+            </a:r>
+          </a:p>
+        </p:txBody>
+      </p:sp>
+    </p:spTree>
+  </p:cSld>
+</p:sld>
+</file>
+
+<file path=ppt/slides/slide41.xml><?xml version="1.0" encoding="utf-8"?>
+<p:sld xmlns:a="http://schemas.openxmlformats.org/drawingml/2006/main" xmlns:r="http://schemas.openxmlformats.org/officeDocument/2006/relationships" xmlns:p="http://schemas.openxmlformats.org/presentationml/2006/main">
+  <p:cSld>
+    <p:spTree>
+      <p:nvGrpSpPr>
+        <p:cNvPr id="1" name=""/>
+        <p:cNvGrpSpPr/>
+        <p:nvPr/>
+      </p:nvGrpSpPr>
+      <p:grpSpPr>
+        <a:xfrm>
+          <a:off x="0" y="0"/>
+          <a:ext cx="0" cy="0"/>
+          <a:chOff x="0" y="0"/>
+          <a:chExt cx="0" cy="0"/>
+        </a:xfrm>
+      </p:grpSpPr>
+      <p:sp>
+        <p:nvSpPr>
+          <p:cNvPr id="2" name="Title 1"/>
+          <p:cNvSpPr>
+            <a:spLocks noGrp="1"/>
+          </p:cNvSpPr>
+          <p:nvPr>
+            <p:ph type="title"/>
+          </p:nvPr>
+        </p:nvSpPr>
+        <p:spPr/>
+        <p:txBody>
+          <a:bodyPr/>
+          <a:lstStyle/>
+          <a:p>
+            <a:pPr lvl="0" indent="0" marL="0">
+              <a:buNone/>
+            </a:pPr>
+            <a:r>
+              <a:rPr/>
+              <a:t>Why you are needed</a:t>
+            </a:r>
+          </a:p>
+        </p:txBody>
+      </p:sp>
+      <p:sp>
+        <p:nvSpPr>
+          <p:cNvPr id="3" name="Content Placeholder 2"/>
+          <p:cNvSpPr>
+            <a:spLocks noGrp="1"/>
+          </p:cNvSpPr>
+          <p:nvPr>
+            <p:ph idx="1"/>
+          </p:nvPr>
+        </p:nvSpPr>
+        <p:spPr/>
+        <p:txBody>
+          <a:bodyPr/>
+          <a:lstStyle/>
+          <a:p>
+            <a:pPr lvl="0" indent="-342900" marL="342900">
+              <a:buAutoNum type="arabicPeriod"/>
+            </a:pPr>
+            <a:r>
+              <a:rPr/>
+              <a:t>Too many geeks, not enough scientists</a:t>
+            </a:r>
+          </a:p>
+          <a:p>
+            <a:pPr lvl="0" indent="-342900" marL="342900">
+              <a:buAutoNum type="arabicPeriod"/>
+            </a:pPr>
+            <a:r>
+              <a:rPr/>
+              <a:t>More racial, gender diversity is needed</a:t>
+            </a:r>
+          </a:p>
+          <a:p>
+            <a:pPr lvl="0" indent="0" marL="0">
+              <a:buNone/>
+            </a:pPr>
+            <a:r>
+              <a:rPr/>
+              <a:t>If you are interested, email me: </a:t>
+            </a:r>
+            <a:r>
+              <a:rPr>
+                <a:hlinkClick r:id="rId3"/>
+              </a:rPr>
+              <a:t>simons@umkc.edu</a:t>
+            </a:r>
+          </a:p>
+          <a:p>
+            <a:pPr lvl="0" indent="0" marL="0">
+              <a:buNone/>
+            </a:pPr>
+            <a:r>
+              <a:rPr/>
+              <a:t>You can find my talk here:</a:t>
+            </a:r>
+          </a:p>
+          <a:p>
+            <a:pPr lvl="0" indent="0" marL="0">
+              <a:buNone/>
+            </a:pPr>
+            <a:r>
+              <a:rPr>
+                <a:hlinkClick r:id="rId4"/>
+              </a:rPr>
+              <a:t>https://github.com/pmean/talks/blob/master/dark-side/2022-talk.pptx</a:t>
+            </a:r>
+          </a:p>
+        </p:txBody>
+      </p:sp>
+    </p:spTree>
+  </p:cSld>
+</p:sld>
+</file>
+
 <file path=ppt/slides/slide5.xml><?xml version="1.0" encoding="utf-8"?>
 <p:sld xmlns:a="http://schemas.openxmlformats.org/drawingml/2006/main" xmlns:r="http://schemas.openxmlformats.org/officeDocument/2006/relationships" xmlns:p="http://schemas.openxmlformats.org/presentationml/2006/main">
   <p:cSld>
@@ -10619,12 +11204,31 @@
             </a:r>
           </a:p>
           <a:p>
-            <a:pPr lvl="0" indent="0" marL="0">
-              <a:buNone/>
-            </a:pPr>
-            <a:r>
-              <a:rPr/>
-              <a:t>+v Everything can be reduced to a mathematical equation. + Experiments can reveal the realities of the world. + Some questions are impossible to answer. + We construct our own reality based on our own lived experiences</a:t>
+            <a:pPr lvl="0"/>
+            <a:r>
+              <a:rPr/>
+              <a:t>Everything can be reduced to a mathematical equation.</a:t>
+            </a:r>
+          </a:p>
+          <a:p>
+            <a:pPr lvl="0"/>
+            <a:r>
+              <a:rPr/>
+              <a:t>Experiments can reveal the realities of the world.</a:t>
+            </a:r>
+          </a:p>
+          <a:p>
+            <a:pPr lvl="0"/>
+            <a:r>
+              <a:rPr/>
+              <a:t>Some questions are impossible to answer.</a:t>
+            </a:r>
+          </a:p>
+          <a:p>
+            <a:pPr lvl="0"/>
+            <a:r>
+              <a:rPr/>
+              <a:t>We construct our own reality based on our own lived experiences</a:t>
             </a:r>
           </a:p>
         </p:txBody>
@@ -10778,7 +11382,7 @@
       </p:sp>
       <p:pic>
         <p:nvPicPr>
-          <p:cNvPr descr="fig:  http://www.pmean.com/new-images/21/dark-side-01.png" id="0" name="Picture 1"/>
+          <p:cNvPr descr="http://www.pmean.com/new-images/21/dark-side-01.png" id="0" name="Picture 1"/>
           <p:cNvPicPr>
             <a:picLocks noGrp="1" noChangeAspect="1"/>
           </p:cNvPicPr>
@@ -10885,7 +11489,7 @@
       </p:sp>
       <p:pic>
         <p:nvPicPr>
-          <p:cNvPr descr="fig:  http://www.pmean.com/new-images/21/dark-side-02.png" id="0" name="Picture 1"/>
+          <p:cNvPr descr="http://www.pmean.com/new-images/21/dark-side-02.png" id="0" name="Picture 1"/>
           <p:cNvPicPr>
             <a:picLocks noGrp="1" noChangeAspect="1"/>
           </p:cNvPicPr>

</xml_diff>